<commit_message>
Fix lab 7 (#20)
</commit_message>
<xml_diff>
--- a/labs/lab7/Lab7.pptx
+++ b/labs/lab7/Lab7.pptx
@@ -225,7 +225,7 @@
           <a:p>
             <a:fld id="{59041DB8-B66F-4DC8-A96E-33677E0F90FF}" type="datetimeFigureOut">
               <a:rPr lang="en-US" smtClean="0"/>
-              <a:t>2/27/2024</a:t>
+              <a:t>2/28/2024</a:t>
             </a:fld>
             <a:endParaRPr lang="en-US"/>
           </a:p>
@@ -390,7 +390,7 @@
           <a:p>
             <a:fld id="{DEB49C4A-65AC-492D-9701-81B46C3AD0E4}" type="datetimeFigureOut">
               <a:rPr lang="en-US" smtClean="0"/>
-              <a:t>2/27/2024</a:t>
+              <a:t>2/28/2024</a:t>
             </a:fld>
             <a:endParaRPr lang="en-US"/>
           </a:p>
@@ -3638,7 +3638,7 @@
           <a:p>
             <a:fld id="{384A29A4-78C8-47AB-BA06-22CB45938951}" type="datetime1">
               <a:rPr lang="en-US" smtClean="0"/>
-              <a:t>2/27/2024</a:t>
+              <a:t>2/28/2024</a:t>
             </a:fld>
             <a:endParaRPr lang="en-US"/>
           </a:p>
@@ -3833,7 +3833,7 @@
           <a:p>
             <a:fld id="{E1ED4ACF-2D82-46F2-A8E9-23963AA34E86}" type="datetime1">
               <a:rPr lang="en-US" smtClean="0"/>
-              <a:t>2/27/2024</a:t>
+              <a:t>2/28/2024</a:t>
             </a:fld>
             <a:endParaRPr lang="en-US"/>
           </a:p>
@@ -4017,7 +4017,7 @@
           <a:p>
             <a:fld id="{AE374B5B-21A0-4192-BF4C-38187F1A68D8}" type="datetime1">
               <a:rPr lang="en-US" smtClean="0"/>
-              <a:t>2/27/2024</a:t>
+              <a:t>2/28/2024</a:t>
             </a:fld>
             <a:endParaRPr lang="en-US"/>
           </a:p>
@@ -6358,7 +6358,7 @@
           <a:p>
             <a:fld id="{33B5CF7C-B333-48E1-A4A6-83A3C8B73AC0}" type="datetime1">
               <a:rPr lang="en-US" smtClean="0"/>
-              <a:t>2/27/2024</a:t>
+              <a:t>2/28/2024</a:t>
             </a:fld>
             <a:endParaRPr lang="en-US"/>
           </a:p>
@@ -6811,7 +6811,7 @@
           <a:p>
             <a:fld id="{AE320762-5CBF-4210-AB54-376B091119F8}" type="datetime1">
               <a:rPr lang="en-US" smtClean="0"/>
-              <a:t>2/27/2024</a:t>
+              <a:t>2/28/2024</a:t>
             </a:fld>
             <a:endParaRPr lang="en-US"/>
           </a:p>
@@ -6943,7 +6943,7 @@
           <a:p>
             <a:fld id="{7F0DB371-BF5F-4058-A212-1A908E4D2674}" type="datetime1">
               <a:rPr lang="en-US" smtClean="0"/>
-              <a:t>2/27/2024</a:t>
+              <a:t>2/28/2024</a:t>
             </a:fld>
             <a:endParaRPr lang="en-US"/>
           </a:p>
@@ -8876,7 +8876,7 @@
           <a:p>
             <a:fld id="{60A4083B-90AA-48CF-BAD5-00AA24D7F288}" type="datetime1">
               <a:rPr lang="en-US" smtClean="0"/>
-              <a:t>2/27/2024</a:t>
+              <a:t>2/28/2024</a:t>
             </a:fld>
             <a:endParaRPr lang="en-US"/>
           </a:p>
@@ -11135,7 +11135,7 @@
             <a:fld id="{F5BAF629-ECA2-4CF3-B790-9D9BDED98269}" type="datetime1">
               <a:rPr lang="en-US" smtClean="0"/>
               <a:pPr/>
-              <a:t>2/27/2024</a:t>
+              <a:t>2/28/2024</a:t>
             </a:fld>
             <a:endParaRPr lang="en-US"/>
           </a:p>
@@ -15430,7 +15430,7 @@
             <a:fld id="{B51B2453-8663-4C69-AF73-9FD7B1DEC5D0}" type="datetime1">
               <a:rPr lang="en-US" smtClean="0"/>
               <a:pPr/>
-              <a:t>2/27/2024</a:t>
+              <a:t>2/28/2024</a:t>
             </a:fld>
             <a:endParaRPr lang="en-US" dirty="0"/>
           </a:p>
@@ -16024,7 +16024,7 @@
                   <a:schemeClr val="tx1"/>
                 </a:solidFill>
               </a:rPr>
-              <a:t>Univariate least squares</a:t>
+              <a:t>Linear regression (univariate)</a:t>
             </a:r>
             <a:br>
               <a:rPr lang="en-US" dirty="0">
@@ -16198,7 +16198,7 @@
                   <a:schemeClr val="tx1"/>
                 </a:solidFill>
               </a:rPr>
-              <a:t>Multivariate least squares</a:t>
+              <a:t>Linear regression (multivariate)</a:t>
             </a:r>
             <a:br>
               <a:rPr lang="en-US" dirty="0">
@@ -16372,7 +16372,7 @@
                   <a:schemeClr val="tx1"/>
                 </a:solidFill>
               </a:rPr>
-              <a:t>Multivariate least squares</a:t>
+              <a:t>Linear regression (multivariate)</a:t>
             </a:r>
             <a:br>
               <a:rPr lang="en-US" dirty="0">
@@ -17141,7 +17141,15 @@
             </a:r>
             <a:r>
               <a:rPr lang="en-US" i="1" dirty="0"/>
-              <a:t>y = ax + b</a:t>
+              <a:t>y = </a:t>
+            </a:r>
+            <a:r>
+              <a:rPr lang="en-US" dirty="0" err="1"/>
+              <a:t>θx</a:t>
+            </a:r>
+            <a:r>
+              <a:rPr lang="en-US" i="1" dirty="0"/>
+              <a:t> </a:t>
             </a:r>
           </a:p>
           <a:p>
@@ -17152,7 +17160,11 @@
             </a:r>
             <a:r>
               <a:rPr lang="en-US" i="1" dirty="0"/>
-              <a:t>y = ax</a:t>
+              <a:t>y = </a:t>
+            </a:r>
+            <a:r>
+              <a:rPr lang="en-US" dirty="0"/>
+              <a:t>θ</a:t>
             </a:r>
             <a:r>
               <a:rPr lang="en-US" i="1" baseline="-25000" dirty="0"/>
@@ -17160,7 +17172,19 @@
             </a:r>
             <a:r>
               <a:rPr lang="en-US" i="1" dirty="0"/>
-              <a:t> + bx</a:t>
+              <a:t>x</a:t>
+            </a:r>
+            <a:r>
+              <a:rPr lang="en-US" i="1" baseline="-25000" dirty="0"/>
+              <a:t>1</a:t>
+            </a:r>
+            <a:r>
+              <a:rPr lang="en-US" i="1" dirty="0"/>
+              <a:t> + </a:t>
+            </a:r>
+            <a:r>
+              <a:rPr lang="en-US" dirty="0"/>
+              <a:t>θ</a:t>
             </a:r>
             <a:r>
               <a:rPr lang="en-US" i="1" baseline="-25000" dirty="0"/>
@@ -17168,16 +17192,33 @@
             </a:r>
             <a:r>
               <a:rPr lang="en-US" i="1" dirty="0"/>
-              <a:t> + cx</a:t>
+              <a:t>x</a:t>
+            </a:r>
+            <a:r>
+              <a:rPr lang="en-US" i="1" baseline="-25000" dirty="0"/>
+              <a:t>2</a:t>
+            </a:r>
+            <a:r>
+              <a:rPr lang="en-US" i="1" dirty="0"/>
+              <a:t> + </a:t>
+            </a:r>
+            <a:r>
+              <a:rPr lang="en-US" dirty="0"/>
+              <a:t>θ</a:t>
+            </a:r>
+            <a:r>
+              <a:rPr lang="en-US" i="1" baseline="-25000" dirty="0"/>
+              <a:t>3</a:t>
+            </a:r>
+            <a:r>
+              <a:rPr lang="en-US" i="1" dirty="0"/>
+              <a:t>x</a:t>
             </a:r>
             <a:r>
               <a:rPr lang="en-US" i="1" baseline="-25000" dirty="0"/>
               <a:t>3 </a:t>
             </a:r>
-            <a:r>
-              <a:rPr lang="en-US" i="1" dirty="0"/>
-              <a:t>+ d</a:t>
-            </a:r>
+            <a:endParaRPr lang="en-US" i="1" dirty="0"/>
           </a:p>
           <a:p>
             <a:pPr lvl="1"/>
@@ -17190,8 +17231,16 @@
               <a:t>y = </a:t>
             </a:r>
             <a:r>
+              <a:rPr lang="en-US" dirty="0" err="1"/>
+              <a:t>θ</a:t>
+            </a:r>
+            <a:r>
+              <a:rPr lang="en-US" i="1" baseline="-25000" dirty="0" err="1"/>
+              <a:t>k</a:t>
+            </a:r>
+            <a:r>
               <a:rPr lang="en-US" i="1" dirty="0" err="1"/>
-              <a:t>ax</a:t>
+              <a:t>x</a:t>
             </a:r>
             <a:r>
               <a:rPr lang="en-US" i="1" baseline="30000" dirty="0" err="1"/>
@@ -17201,10 +17250,7 @@
               <a:rPr lang="en-US" i="1" baseline="30000" dirty="0"/>
               <a:t> </a:t>
             </a:r>
-            <a:r>
-              <a:rPr lang="en-US" i="1" dirty="0"/>
-              <a:t>+ b</a:t>
-            </a:r>
+            <a:endParaRPr lang="en-US" i="1" dirty="0"/>
           </a:p>
           <a:p>
             <a:pPr lvl="1"/>
@@ -17214,7 +17260,59 @@
             </a:r>
             <a:r>
               <a:rPr lang="en-US" i="1" dirty="0"/>
-              <a:t>y = ax</a:t>
+              <a:t>y = </a:t>
+            </a:r>
+            <a:r>
+              <a:rPr lang="en-US" dirty="0"/>
+              <a:t>θ</a:t>
+            </a:r>
+            <a:r>
+              <a:rPr lang="en-US" i="1" baseline="-25000" dirty="0"/>
+              <a:t>1</a:t>
+            </a:r>
+            <a:r>
+              <a:rPr lang="en-US" i="1" dirty="0"/>
+              <a:t>x</a:t>
+            </a:r>
+            <a:r>
+              <a:rPr lang="en-US" i="1" baseline="-25000" dirty="0"/>
+              <a:t>1</a:t>
+            </a:r>
+            <a:r>
+              <a:rPr lang="en-US" i="1" dirty="0"/>
+              <a:t> + </a:t>
+            </a:r>
+            <a:r>
+              <a:rPr lang="en-US" dirty="0"/>
+              <a:t>θ</a:t>
+            </a:r>
+            <a:r>
+              <a:rPr lang="en-US" i="1" baseline="-25000" dirty="0"/>
+              <a:t>2</a:t>
+            </a:r>
+            <a:r>
+              <a:rPr lang="en-US" i="1" dirty="0"/>
+              <a:t>x</a:t>
+            </a:r>
+            <a:r>
+              <a:rPr lang="en-US" i="1" baseline="-25000" dirty="0"/>
+              <a:t>2</a:t>
+            </a:r>
+            <a:r>
+              <a:rPr lang="en-US" i="1" dirty="0"/>
+              <a:t> + </a:t>
+            </a:r>
+            <a:r>
+              <a:rPr lang="en-US" dirty="0"/>
+              <a:t>θ</a:t>
+            </a:r>
+            <a:r>
+              <a:rPr lang="en-US" i="1" baseline="-25000" dirty="0"/>
+              <a:t>3</a:t>
+            </a:r>
+            <a:r>
+              <a:rPr lang="en-US" i="1" dirty="0"/>
+              <a:t>x</a:t>
             </a:r>
             <a:r>
               <a:rPr lang="en-US" i="1" baseline="-25000" dirty="0"/>
@@ -17228,18 +17326,6 @@
               <a:rPr lang="en-US" i="1" baseline="-25000" dirty="0"/>
               <a:t>2</a:t>
             </a:r>
-            <a:r>
-              <a:rPr lang="en-US" i="1" baseline="30000" dirty="0"/>
-              <a:t> </a:t>
-            </a:r>
-            <a:r>
-              <a:rPr lang="en-US" i="1" dirty="0"/>
-              <a:t>+ b</a:t>
-            </a:r>
-            <a:endParaRPr lang="en-US" dirty="0"/>
-          </a:p>
-          <a:p>
-            <a:pPr lvl="1"/>
             <a:endParaRPr lang="en-US" dirty="0"/>
           </a:p>
           <a:p>
@@ -17312,8 +17398,8 @@
           </a:p>
         </p:txBody>
       </p:sp>
-      <mc:AlternateContent xmlns:mc="http://schemas.openxmlformats.org/markup-compatibility/2006">
-        <mc:Choice xmlns:a14="http://schemas.microsoft.com/office/drawing/2010/main" Requires="a14">
+      <mc:AlternateContent xmlns:mc="http://schemas.openxmlformats.org/markup-compatibility/2006" xmlns:a14="http://schemas.microsoft.com/office/drawing/2010/main">
+        <mc:Choice Requires="a14">
           <p:sp>
             <p:nvSpPr>
               <p:cNvPr id="3" name="Content Placeholder 2"/>
@@ -18170,7 +18256,7 @@
             </p:txBody>
           </p:sp>
         </mc:Choice>
-        <mc:Fallback>
+        <mc:Fallback xmlns="">
           <p:sp>
             <p:nvSpPr>
               <p:cNvPr id="3" name="Content Placeholder 2"/>
@@ -18272,8 +18358,8 @@
           </a:p>
         </p:txBody>
       </p:sp>
-      <mc:AlternateContent xmlns:mc="http://schemas.openxmlformats.org/markup-compatibility/2006">
-        <mc:Choice xmlns:a14="http://schemas.microsoft.com/office/drawing/2010/main" Requires="a14">
+      <mc:AlternateContent xmlns:mc="http://schemas.openxmlformats.org/markup-compatibility/2006" xmlns:a14="http://schemas.microsoft.com/office/drawing/2010/main">
+        <mc:Choice Requires="a14">
           <p:sp>
             <p:nvSpPr>
               <p:cNvPr id="3" name="Content Placeholder 2"/>
@@ -18663,7 +18749,7 @@
             </p:txBody>
           </p:sp>
         </mc:Choice>
-        <mc:Fallback>
+        <mc:Fallback xmlns="">
           <p:sp>
             <p:nvSpPr>
               <p:cNvPr id="3" name="Content Placeholder 2"/>
@@ -18853,76 +18939,86 @@
           </a:bodyPr>
           <a:lstStyle/>
           <a:p>
+            <a:pPr lvl="1"/>
             <a:r>
-              <a:rPr lang="en-US" sz="1800" b="0" i="0" u="none" strike="noStrike" baseline="0" dirty="0">
-                <a:solidFill>
-                  <a:srgbClr val="2C2D2C"/>
-                </a:solidFill>
-                <a:latin typeface="Arial" panose="020B0604020202020204" pitchFamily="34" charset="0"/>
-              </a:rPr>
-              <a:t>Begin at a random point</a:t>
+              <a:rPr lang="en-US" dirty="0"/>
+              <a:t>Input: </a:t>
             </a:r>
           </a:p>
           <a:p>
+            <a:pPr lvl="2"/>
             <a:r>
-              <a:rPr lang="en-US" sz="1800" b="0" i="0" u="none" strike="noStrike" baseline="0" dirty="0">
-                <a:solidFill>
-                  <a:srgbClr val="2C2D2C"/>
-                </a:solidFill>
-                <a:latin typeface="Arial" panose="020B0604020202020204" pitchFamily="34" charset="0"/>
-              </a:rPr>
-              <a:t>Calculate the function value at the point and the gradient (partial derivatives)</a:t>
+              <a:rPr lang="en-US" dirty="0"/>
+              <a:t>parameters (θ)</a:t>
             </a:r>
           </a:p>
           <a:p>
+            <a:pPr lvl="2"/>
             <a:r>
-              <a:rPr lang="en-US" sz="1800" b="0" i="0" u="none" strike="noStrike" baseline="0" dirty="0">
-                <a:solidFill>
-                  <a:srgbClr val="2C2D2C"/>
-                </a:solidFill>
-                <a:latin typeface="Arial" panose="020B0604020202020204" pitchFamily="34" charset="0"/>
-              </a:rPr>
-              <a:t>Pick a new point, move in the direction of steepest descent. The size of the step is governed by the </a:t>
+              <a:rPr lang="en-US" dirty="0"/>
+              <a:t>gradient of the loss function with respect to the parameters (</a:t>
             </a:r>
             <a:r>
-              <a:rPr lang="en-US" sz="1800" b="1" i="0" u="none" strike="noStrike" baseline="0" dirty="0">
-                <a:solidFill>
-                  <a:srgbClr val="2C2D2C"/>
-                </a:solidFill>
-                <a:latin typeface="Arial" panose="020B0604020202020204" pitchFamily="34" charset="0"/>
-              </a:rPr>
-              <a:t>learning rate</a:t>
+              <a:rPr lang="en-US" dirty="0" err="1"/>
+              <a:t>dθ</a:t>
             </a:r>
             <a:r>
-              <a:rPr lang="en-US" sz="1800" b="0" i="0" u="none" strike="noStrike" baseline="0" dirty="0">
-                <a:solidFill>
-                  <a:srgbClr val="2C2D2C"/>
-                </a:solidFill>
-                <a:latin typeface="Arial" panose="020B0604020202020204" pitchFamily="34" charset="0"/>
-              </a:rPr>
-              <a:t>. </a:t>
+              <a:rPr lang="en-US" dirty="0"/>
+              <a:t>), </a:t>
             </a:r>
           </a:p>
           <a:p>
+            <a:pPr lvl="2"/>
             <a:r>
-              <a:rPr lang="en-US" sz="1800" dirty="0">
-                <a:solidFill>
-                  <a:srgbClr val="2C2D2C"/>
-                </a:solidFill>
-                <a:latin typeface="Arial" panose="020B0604020202020204" pitchFamily="34" charset="0"/>
-              </a:rPr>
-              <a:t>Repeat!</a:t>
+              <a:rPr lang="en-US" dirty="0"/>
+              <a:t>learning rate (α) </a:t>
             </a:r>
-            <a:endParaRPr lang="en-US" sz="1800" b="0" i="0" u="none" strike="noStrike" baseline="0" dirty="0">
-              <a:solidFill>
-                <a:srgbClr val="2C2D2C"/>
-              </a:solidFill>
-              <a:latin typeface="Arial" panose="020B0604020202020204" pitchFamily="34" charset="0"/>
-            </a:endParaRPr>
           </a:p>
           <a:p>
             <a:pPr lvl="1"/>
-            <a:endParaRPr lang="en-US" dirty="0"/>
+            <a:r>
+              <a:rPr lang="en-US" dirty="0"/>
+              <a:t>Update parameters: </a:t>
+            </a:r>
+            <a:r>
+              <a:rPr lang="en-US" dirty="0" err="1"/>
+              <a:t>θ</a:t>
+            </a:r>
+            <a:r>
+              <a:rPr lang="en-US" baseline="-25000" dirty="0" err="1"/>
+              <a:t>new</a:t>
+            </a:r>
+            <a:r>
+              <a:rPr lang="en-US" dirty="0"/>
+              <a:t> = θ − α× </a:t>
+            </a:r>
+            <a:r>
+              <a:rPr lang="en-US" dirty="0" err="1"/>
+              <a:t>dθ</a:t>
+            </a:r>
+            <a:r>
+              <a:rPr lang="en-US" dirty="0"/>
+              <a:t> </a:t>
+            </a:r>
+          </a:p>
+          <a:p>
+            <a:pPr lvl="1"/>
+            <a:r>
+              <a:rPr lang="en-US" dirty="0"/>
+              <a:t>Output: updated parameters (</a:t>
+            </a:r>
+            <a:r>
+              <a:rPr lang="en-US" dirty="0" err="1"/>
+              <a:t>θ</a:t>
+            </a:r>
+            <a:r>
+              <a:rPr lang="en-US" baseline="-25000" dirty="0" err="1"/>
+              <a:t>new</a:t>
+            </a:r>
+            <a:r>
+              <a:rPr lang="en-US" dirty="0"/>
+              <a:t>) </a:t>
+            </a:r>
           </a:p>
           <a:p>
             <a:pPr marL="0" indent="0">

</xml_diff>